<commit_message>
Add lesson 0Add lesson 04 slides
</commit_message>
<xml_diff>
--- a/lessons/03/slides/lesson03.pptx
+++ b/lessons/03/slides/lesson03.pptx
@@ -12651,8 +12651,12 @@
               </a:spcBef>
             </a:pPr>
             <a:r>
+              <a:rPr lang="en-US" b="1" dirty="0"/>
+              <a:t>Access the Assignment</a:t>
+            </a:r>
+            <a:r>
               <a:rPr lang="en-US" dirty="0"/>
-              <a:t>Assignment can be found </a:t>
+              <a:t>: Find it </a:t>
             </a:r>
             <a:r>
               <a:rPr lang="en-US" dirty="0">
@@ -12669,8 +12673,12 @@
               </a:spcBef>
             </a:pPr>
             <a:r>
+              <a:rPr lang="en-US" b="1" dirty="0"/>
+              <a:t>Follow the README</a:t>
+            </a:r>
+            <a:r>
               <a:rPr lang="en-US" dirty="0"/>
-              <a:t>Follow the instructions from the README</a:t>
+              <a:t>: Carefully read and follow the instructions from the README</a:t>
             </a:r>
           </a:p>
           <a:p>
@@ -12680,9 +12688,14 @@
               </a:spcBef>
             </a:pPr>
             <a:r>
+              <a:rPr lang="en-US" b="1" dirty="0"/>
+              <a:t>Need Help?</a:t>
+            </a:r>
+            <a:r>
               <a:rPr lang="en-US" dirty="0"/>
-              <a:t>Ask any questions on the Slack group</a:t>
+              <a:t>: Post any questions in the Slack group for support</a:t>
             </a:r>
+            <a:endParaRPr lang="en-US" b="1" dirty="0"/>
           </a:p>
         </p:txBody>
       </p:sp>
@@ -14906,6 +14919,15 @@
 </file>
 
 <file path=customXml/item1.xml><?xml version="1.0" encoding="utf-8"?>
+<?mso-contentType ?>
+<FormTemplates xmlns="http://schemas.microsoft.com/sharepoint/v3/contenttype/forms">
+  <Display>DocumentLibraryForm</Display>
+  <Edit>DocumentLibraryForm</Edit>
+  <New>DocumentLibraryForm</New>
+</FormTemplates>
+</file>
+
+<file path=customXml/item2.xml><?xml version="1.0" encoding="utf-8"?>
 <ct:contentTypeSchema xmlns:ct="http://schemas.microsoft.com/office/2006/metadata/contentType" xmlns:ma="http://schemas.microsoft.com/office/2006/metadata/properties/metaAttributes" ct:_="" ma:_="" ma:contentTypeName="Document" ma:contentTypeID="0x010100AF3FF15707724F49A972C13B33FAAA8B" ma:contentTypeVersion="37" ma:contentTypeDescription="Create a new document." ma:contentTypeScope="" ma:versionID="0d6da3a96eaa39d46166618daaa295aa">
   <xsd:schema xmlns:xsd="http://www.w3.org/2001/XMLSchema" xmlns:xs="http://www.w3.org/2001/XMLSchema" xmlns:p="http://schemas.microsoft.com/office/2006/metadata/properties" xmlns:ns2="a1200294-7566-47bd-bcc6-0c4e5d371f43" xmlns:ns3="babfc5af-ba08-4223-8118-2e61d2979772" targetNamespace="http://schemas.microsoft.com/office/2006/metadata/properties" ma:root="true" ma:fieldsID="04dea3cd8ac799b83681f5649b523f8d" ns2:_="" ns3:_="">
     <xsd:import namespace="a1200294-7566-47bd-bcc6-0c4e5d371f43"/>
@@ -15186,15 +15208,6 @@
 </ct:contentTypeSchema>
 </file>
 
-<file path=customXml/item2.xml><?xml version="1.0" encoding="utf-8"?>
-<?mso-contentType ?>
-<FormTemplates xmlns="http://schemas.microsoft.com/sharepoint/v3/contenttype/forms">
-  <Display>DocumentLibraryForm</Display>
-  <Edit>DocumentLibraryForm</Edit>
-  <New>DocumentLibraryForm</New>
-</FormTemplates>
-</file>
-
 <file path=customXml/item3.xml><?xml version="1.0" encoding="utf-8"?>
 <p:properties xmlns:p="http://schemas.microsoft.com/office/2006/metadata/properties" xmlns:xsi="http://www.w3.org/2001/XMLSchema-instance" xmlns:pc="http://schemas.microsoft.com/office/infopath/2007/PartnerControls">
   <documentManagement>
@@ -15216,6 +15229,14 @@
 </file>
 
 <file path=customXml/itemProps1.xml><?xml version="1.0" encoding="utf-8"?>
+<ds:datastoreItem xmlns:ds="http://schemas.openxmlformats.org/officeDocument/2006/customXml" ds:itemID="{3C21C174-D453-4914-8411-DE970D7B2773}">
+  <ds:schemaRefs>
+    <ds:schemaRef ds:uri="http://schemas.microsoft.com/sharepoint/v3/contenttype/forms"/>
+  </ds:schemaRefs>
+</ds:datastoreItem>
+</file>
+
+<file path=customXml/itemProps2.xml><?xml version="1.0" encoding="utf-8"?>
 <ds:datastoreItem xmlns:ds="http://schemas.openxmlformats.org/officeDocument/2006/customXml" ds:itemID="{15B5AC1E-3F8B-4736-B201-2EF42848A6EC}">
   <ds:schemaRefs>
     <ds:schemaRef ds:uri="http://schemas.microsoft.com/office/2006/metadata/contentType"/>
@@ -15234,14 +15255,6 @@
 </ds:datastoreItem>
 </file>
 
-<file path=customXml/itemProps2.xml><?xml version="1.0" encoding="utf-8"?>
-<ds:datastoreItem xmlns:ds="http://schemas.openxmlformats.org/officeDocument/2006/customXml" ds:itemID="{3C21C174-D453-4914-8411-DE970D7B2773}">
-  <ds:schemaRefs>
-    <ds:schemaRef ds:uri="http://schemas.microsoft.com/sharepoint/v3/contenttype/forms"/>
-  </ds:schemaRefs>
-</ds:datastoreItem>
-</file>
-
 <file path=customXml/itemProps3.xml><?xml version="1.0" encoding="utf-8"?>
 <ds:datastoreItem xmlns:ds="http://schemas.openxmlformats.org/officeDocument/2006/customXml" ds:itemID="{06C38A34-1C09-44AF-A4CC-A67B6F751BAC}">
   <ds:schemaRefs>

</xml_diff>